<commit_message>
Paper 12 Slides - Minor Change
</commit_message>
<xml_diff>
--- a/Paper_Presentation/Paper_12_-_Presentation/Presentation_Slides_(Team_9_Only)/COMP-SCI_5542_(SP17)_-_Paper_12_Presentation_(2nd_Half)_-_Team_9_-_Slides.pptx
+++ b/Paper_Presentation/Paper_12_-_Presentation/Presentation_Slides_(Team_9_Only)/COMP-SCI_5542_(SP17)_-_Paper_12_Presentation_(2nd_Half)_-_Team_9_-_Slides.pptx
@@ -565,31 +565,8 @@
                 <a:ea typeface="Tahoma" panose="020B0604030504040204" pitchFamily="34" charset="0"/>
                 <a:cs typeface="Tahoma" panose="020B0604030504040204" pitchFamily="34" charset="0"/>
               </a:rPr>
-              <a:t>COMP-SCI 5542 (SP17) - Big Data Analytics and </a:t>
-            </a:r>
-            <a:r>
-              <a:rPr lang="en-US" sz="1700" b="1" dirty="0" smtClean="0">
-                <a:solidFill>
-                  <a:schemeClr val="accent6">
-                    <a:lumMod val="75000"/>
-                  </a:schemeClr>
-                </a:solidFill>
-                <a:latin typeface="Tahoma" panose="020B0604030504040204" pitchFamily="34" charset="0"/>
-                <a:ea typeface="Tahoma" panose="020B0604030504040204" pitchFamily="34" charset="0"/>
-                <a:cs typeface="Tahoma" panose="020B0604030504040204" pitchFamily="34" charset="0"/>
-              </a:rPr>
-              <a:t>Applications</a:t>
-            </a:r>
-            <a:endParaRPr lang="en-US" sz="1700" b="1" dirty="0" smtClean="0">
-              <a:solidFill>
-                <a:schemeClr val="accent6">
-                  <a:lumMod val="75000"/>
-                </a:schemeClr>
-              </a:solidFill>
-              <a:latin typeface="Tahoma" panose="020B0604030504040204" pitchFamily="34" charset="0"/>
-              <a:ea typeface="Tahoma" panose="020B0604030504040204" pitchFamily="34" charset="0"/>
-              <a:cs typeface="Tahoma" panose="020B0604030504040204" pitchFamily="34" charset="0"/>
-            </a:endParaRPr>
+              <a:t>COMP-SCI 5542 (SP17) - Big Data Analytics and Applications</a:t>
+            </a:r>
           </a:p>
           <a:p>
             <a:pPr algn="ctr"/>
@@ -877,31 +854,8 @@
                 <a:ea typeface="Tahoma" panose="020B0604030504040204" pitchFamily="34" charset="0"/>
                 <a:cs typeface="Tahoma" panose="020B0604030504040204" pitchFamily="34" charset="0"/>
               </a:rPr>
-              <a:t>COMP-SCI 5542 (SP17) - Big Data Analytics and </a:t>
-            </a:r>
-            <a:r>
-              <a:rPr lang="en-US" sz="1700" b="1" dirty="0" smtClean="0">
-                <a:solidFill>
-                  <a:schemeClr val="accent6">
-                    <a:lumMod val="75000"/>
-                  </a:schemeClr>
-                </a:solidFill>
-                <a:latin typeface="Tahoma" panose="020B0604030504040204" pitchFamily="34" charset="0"/>
-                <a:ea typeface="Tahoma" panose="020B0604030504040204" pitchFamily="34" charset="0"/>
-                <a:cs typeface="Tahoma" panose="020B0604030504040204" pitchFamily="34" charset="0"/>
-              </a:rPr>
-              <a:t>Applications</a:t>
-            </a:r>
-            <a:endParaRPr lang="en-US" sz="1700" b="1" dirty="0" smtClean="0">
-              <a:solidFill>
-                <a:schemeClr val="accent6">
-                  <a:lumMod val="75000"/>
-                </a:schemeClr>
-              </a:solidFill>
-              <a:latin typeface="Tahoma" panose="020B0604030504040204" pitchFamily="34" charset="0"/>
-              <a:ea typeface="Tahoma" panose="020B0604030504040204" pitchFamily="34" charset="0"/>
-              <a:cs typeface="Tahoma" panose="020B0604030504040204" pitchFamily="34" charset="0"/>
-            </a:endParaRPr>
+              <a:t>COMP-SCI 5542 (SP17) - Big Data Analytics and Applications</a:t>
+            </a:r>
           </a:p>
           <a:p>
             <a:pPr algn="ctr"/>
@@ -1178,7 +1132,7 @@
           </a:ln>
           <a:extLst>
             <a:ext uri="{C572A759-6A51-4108-AA02-DFA0A04FC94B}">
-              <ma14:wrappingTextBoxFlag xmlns="" xmlns:ma14="http://schemas.microsoft.com/office/mac/drawingml/2011/main" val="1"/>
+              <ma14:wrappingTextBoxFlag xmlns:ma14="http://schemas.microsoft.com/office/mac/drawingml/2011/main" xmlns="" val="1"/>
             </a:ext>
           </a:extLst>
         </p:spPr>
@@ -1226,7 +1180,7 @@
           </a:ln>
           <a:extLst>
             <a:ext uri="{C572A759-6A51-4108-AA02-DFA0A04FC94B}">
-              <ma14:wrappingTextBoxFlag xmlns="" xmlns:ma14="http://schemas.microsoft.com/office/mac/drawingml/2011/main" val="1"/>
+              <ma14:wrappingTextBoxFlag xmlns:ma14="http://schemas.microsoft.com/office/mac/drawingml/2011/main" xmlns="" val="1"/>
             </a:ext>
           </a:extLst>
         </p:spPr>
@@ -1431,7 +1385,7 @@
           </a:ln>
           <a:extLst>
             <a:ext uri="{C572A759-6A51-4108-AA02-DFA0A04FC94B}">
-              <ma14:wrappingTextBoxFlag xmlns="" xmlns:ma14="http://schemas.microsoft.com/office/mac/drawingml/2011/main" val="1"/>
+              <ma14:wrappingTextBoxFlag xmlns:ma14="http://schemas.microsoft.com/office/mac/drawingml/2011/main" xmlns="" val="1"/>
             </a:ext>
           </a:extLst>
         </p:spPr>
@@ -1460,319 +1414,6 @@
           </a:p>
         </p:txBody>
       </p:sp>
-      <p:graphicFrame>
-        <p:nvGraphicFramePr>
-          <p:cNvPr id="27" name="Table"/>
-          <p:cNvGraphicFramePr/>
-          <p:nvPr/>
-        </p:nvGraphicFramePr>
-        <p:xfrm>
-          <a:off x="638441" y="1651000"/>
-          <a:ext cx="7862068" cy="3657510"/>
-        </p:xfrm>
-        <a:graphic>
-          <a:graphicData uri="http://schemas.openxmlformats.org/drawingml/2006/table">
-            <a:tbl>
-              <a:tblPr firstRow="1" firstCol="1" bandRow="1"/>
-              <a:tblGrid>
-                <a:gridCol w="1650441"/>
-                <a:gridCol w="2808027"/>
-                <a:gridCol w="3403600"/>
-              </a:tblGrid>
-              <a:tr h="853410">
-                <a:tc>
-                  <a:txBody>
-                    <a:bodyPr/>
-                    <a:lstStyle/>
-                    <a:p>
-                      <a:pPr algn="l">
-                        <a:defRPr sz="1800"/>
-                      </a:pPr>
-                      <a:endParaRPr dirty="0"/>
-                    </a:p>
-                  </a:txBody>
-                  <a:tcPr marL="0" marR="0" marT="0" marB="0" horzOverflow="overflow"/>
-                </a:tc>
-                <a:tc>
-                  <a:txBody>
-                    <a:bodyPr/>
-                    <a:lstStyle/>
-                    <a:p>
-                      <a:pPr algn="ctr">
-                        <a:defRPr sz="1800" b="0">
-                          <a:solidFill>
-                            <a:srgbClr val="000000"/>
-                          </a:solidFill>
-                        </a:defRPr>
-                      </a:pPr>
-                      <a:r>
-                        <a:rPr b="1" dirty="0">
-                          <a:solidFill>
-                            <a:srgbClr val="FFFFFF"/>
-                          </a:solidFill>
-                        </a:rPr>
-                        <a:t>
-this experiment</a:t>
-                      </a:r>
-                    </a:p>
-                  </a:txBody>
-                  <a:tcPr marL="0" marR="0" marT="0" marB="0" horzOverflow="overflow"/>
-                </a:tc>
-                <a:tc>
-                  <a:txBody>
-                    <a:bodyPr/>
-                    <a:lstStyle/>
-                    <a:p>
-                      <a:pPr algn="l">
-                        <a:defRPr sz="1800"/>
-                      </a:pPr>
-                      <a:endParaRPr dirty="0"/>
-                    </a:p>
-                    <a:p>
-                      <a:pPr algn="ctr">
-                        <a:defRPr sz="1800"/>
-                      </a:pPr>
-                      <a:r>
-                        <a:rPr dirty="0"/>
-                        <a:t>other studies</a:t>
-                      </a:r>
-                    </a:p>
-                  </a:txBody>
-                  <a:tcPr marL="0" marR="0" marT="0" marB="0" horzOverflow="overflow"/>
-                </a:tc>
-              </a:tr>
-              <a:tr h="853410">
-                <a:tc>
-                  <a:txBody>
-                    <a:bodyPr/>
-                    <a:lstStyle/>
-                    <a:p>
-                      <a:pPr algn="ctr">
-                        <a:defRPr sz="1800" b="0">
-                          <a:solidFill>
-                            <a:srgbClr val="000000"/>
-                          </a:solidFill>
-                        </a:defRPr>
-                      </a:pPr>
-                      <a:r>
-                        <a:rPr b="1" dirty="0">
-                          <a:solidFill>
-                            <a:srgbClr val="FFFFFF"/>
-                          </a:solidFill>
-                        </a:rPr>
-                        <a:t>
-hardware</a:t>
-                      </a:r>
-                    </a:p>
-                  </a:txBody>
-                  <a:tcPr marL="0" marR="0" marT="0" marB="0" horzOverflow="overflow"/>
-                </a:tc>
-                <a:tc>
-                  <a:txBody>
-                    <a:bodyPr/>
-                    <a:lstStyle/>
-                    <a:p>
-                      <a:pPr marL="240631" indent="-240631" algn="l">
-                        <a:buSzPct val="100000"/>
-                        <a:buAutoNum type="arabicPeriod"/>
-                        <a:defRPr sz="1800"/>
-                      </a:pPr>
-                      <a:r>
-                        <a:rPr dirty="0"/>
-                        <a:t>head mounted display</a:t>
-                      </a:r>
-                    </a:p>
-                    <a:p>
-                      <a:pPr marL="240631" indent="-240631" algn="l">
-                        <a:buSzPct val="100000"/>
-                        <a:buAutoNum type="arabicPeriod"/>
-                        <a:defRPr sz="1800"/>
-                      </a:pPr>
-                      <a:r>
-                        <a:rPr dirty="0"/>
-                        <a:t>camera</a:t>
-                      </a:r>
-                    </a:p>
-                    <a:p>
-                      <a:pPr marL="240631" indent="-240631" algn="l">
-                        <a:buSzPct val="100000"/>
-                        <a:buAutoNum type="arabicPeriod"/>
-                        <a:defRPr sz="1800"/>
-                      </a:pPr>
-                      <a:r>
-                        <a:rPr dirty="0"/>
-                        <a:t>motion capture</a:t>
-                      </a:r>
-                    </a:p>
-                  </a:txBody>
-                  <a:tcPr marL="0" marR="0" marT="0" marB="0" horzOverflow="overflow"/>
-                </a:tc>
-                <a:tc>
-                  <a:txBody>
-                    <a:bodyPr/>
-                    <a:lstStyle/>
-                    <a:p>
-                      <a:pPr marL="240631" indent="-240631" algn="l">
-                        <a:buSzPct val="100000"/>
-                        <a:buAutoNum type="arabicPeriod"/>
-                        <a:defRPr sz="1800"/>
-                      </a:pPr>
-                      <a:r>
-                        <a:rPr dirty="0"/>
-                        <a:t>traditional rubber hand illusion</a:t>
-                      </a:r>
-                    </a:p>
-                    <a:p>
-                      <a:pPr marL="240631" indent="-240631" algn="l">
-                        <a:buSzPct val="100000"/>
-                        <a:buAutoNum type="arabicPeriod"/>
-                        <a:defRPr sz="1800"/>
-                      </a:pPr>
-                      <a:r>
-                        <a:rPr dirty="0"/>
-                        <a:t>invisible body</a:t>
-                      </a:r>
-                    </a:p>
-                    <a:p>
-                      <a:pPr marL="240631" indent="-240631" algn="l">
-                        <a:buSzPct val="100000"/>
-                        <a:buAutoNum type="arabicPeriod"/>
-                        <a:defRPr sz="1800"/>
-                      </a:pPr>
-                      <a:r>
-                        <a:rPr dirty="0"/>
-                        <a:t>full mannequin’s body and an entire real body illusion </a:t>
-                      </a:r>
-                    </a:p>
-                  </a:txBody>
-                  <a:tcPr marL="0" marR="0" marT="0" marB="0" horzOverflow="overflow"/>
-                </a:tc>
-              </a:tr>
-              <a:tr h="853410">
-                <a:tc>
-                  <a:txBody>
-                    <a:bodyPr/>
-                    <a:lstStyle/>
-                    <a:p>
-                      <a:pPr algn="ctr">
-                        <a:defRPr sz="1800" b="0">
-                          <a:solidFill>
-                            <a:srgbClr val="000000"/>
-                          </a:solidFill>
-                        </a:defRPr>
-                      </a:pPr>
-                      <a:endParaRPr dirty="0"/>
-                    </a:p>
-                    <a:p>
-                      <a:pPr algn="ctr">
-                        <a:defRPr sz="1800"/>
-                      </a:pPr>
-                      <a:r>
-                        <a:rPr dirty="0"/>
-                        <a:t>body agency </a:t>
-                      </a:r>
-                      <a:endParaRPr sz="1200" dirty="0"/>
-                    </a:p>
-                  </a:txBody>
-                  <a:tcPr marL="0" marR="0" marT="0" marB="0" horzOverflow="overflow"/>
-                </a:tc>
-                <a:tc>
-                  <a:txBody>
-                    <a:bodyPr/>
-                    <a:lstStyle/>
-                    <a:p>
-                      <a:pPr algn="ctr">
-                        <a:defRPr sz="1800"/>
-                      </a:pPr>
-                      <a:r>
-                        <a:rPr dirty="0"/>
-                        <a:t>
-with</a:t>
-                      </a:r>
-                    </a:p>
-                  </a:txBody>
-                  <a:tcPr marL="0" marR="0" marT="0" marB="0" horzOverflow="overflow"/>
-                </a:tc>
-                <a:tc>
-                  <a:txBody>
-                    <a:bodyPr/>
-                    <a:lstStyle/>
-                    <a:p>
-                      <a:pPr algn="ctr">
-                        <a:defRPr sz="1800"/>
-                      </a:pPr>
-                      <a:r>
-                        <a:rPr dirty="0"/>
-                        <a:t>
-without</a:t>
-                      </a:r>
-                    </a:p>
-                  </a:txBody>
-                  <a:tcPr marL="0" marR="0" marT="0" marB="0" horzOverflow="overflow"/>
-                </a:tc>
-              </a:tr>
-              <a:tr h="853410">
-                <a:tc>
-                  <a:txBody>
-                    <a:bodyPr/>
-                    <a:lstStyle/>
-                    <a:p>
-                      <a:pPr algn="l">
-                        <a:defRPr sz="1800"/>
-                      </a:pPr>
-                      <a:endParaRPr dirty="0"/>
-                    </a:p>
-                    <a:p>
-                      <a:pPr algn="ctr">
-                        <a:defRPr sz="1800"/>
-                      </a:pPr>
-                      <a:r>
-                        <a:rPr dirty="0"/>
-                        <a:t>cost</a:t>
-                      </a:r>
-                    </a:p>
-                  </a:txBody>
-                  <a:tcPr marL="0" marR="0" marT="0" marB="0" horzOverflow="overflow"/>
-                </a:tc>
-                <a:tc>
-                  <a:txBody>
-                    <a:bodyPr/>
-                    <a:lstStyle/>
-                    <a:p>
-                      <a:pPr algn="ctr">
-                        <a:defRPr sz="1800"/>
-                      </a:pPr>
-                      <a:r>
-                        <a:rPr dirty="0"/>
-                        <a:t>
-low cost</a:t>
-                      </a:r>
-                    </a:p>
-                  </a:txBody>
-                  <a:tcPr marL="0" marR="0" marT="0" marB="0" horzOverflow="overflow"/>
-                </a:tc>
-                <a:tc>
-                  <a:txBody>
-                    <a:bodyPr/>
-                    <a:lstStyle/>
-                    <a:p>
-                      <a:pPr algn="ctr">
-                        <a:defRPr sz="1800"/>
-                      </a:pPr>
-                      <a:r>
-                        <a:rPr dirty="0"/>
-                        <a:t>
-might be high</a:t>
-                      </a:r>
-                    </a:p>
-                  </a:txBody>
-                  <a:tcPr marL="0" marR="0" marT="0" marB="0" horzOverflow="overflow"/>
-                </a:tc>
-              </a:tr>
-            </a:tbl>
-          </a:graphicData>
-        </a:graphic>
-      </p:graphicFrame>
       <p:sp>
         <p:nvSpPr>
           <p:cNvPr id="28" name="Table: comparison with other studies related to body ownership illusion present"/>
@@ -1782,7 +1423,7 @@
         <p:spPr>
           <a:xfrm>
             <a:off x="1851782" y="5713729"/>
-            <a:ext cx="5629882" cy="447041"/>
+            <a:ext cx="5629882" cy="276999"/>
           </a:xfrm>
           <a:prstGeom prst="rect">
             <a:avLst/>
@@ -1792,7 +1433,7 @@
           </a:ln>
           <a:extLst>
             <a:ext uri="{C572A759-6A51-4108-AA02-DFA0A04FC94B}">
-              <ma14:wrappingTextBoxFlag xmlns="" xmlns:ma14="http://schemas.microsoft.com/office/mac/drawingml/2011/main" val="1"/>
+              <ma14:wrappingTextBoxFlag xmlns:ma14="http://schemas.microsoft.com/office/mac/drawingml/2011/main" xmlns="" val="1"/>
             </a:ext>
           </a:extLst>
         </p:spPr>
@@ -1807,8 +1448,24 @@
           </a:lstStyle>
           <a:p>
             <a:r>
-              <a:rPr dirty="0"/>
-              <a:t>Table: comparison with other studies related to body ownership illusion present </a:t>
+              <a:rPr b="1" dirty="0"/>
+              <a:t>Table</a:t>
+            </a:r>
+            <a:r>
+              <a:rPr b="1"/>
+              <a:t>: </a:t>
+            </a:r>
+            <a:r>
+              <a:rPr lang="en-US" b="1" smtClean="0"/>
+              <a:t>C</a:t>
+            </a:r>
+            <a:r>
+              <a:rPr b="1" smtClean="0"/>
+              <a:t>omparison </a:t>
+            </a:r>
+            <a:r>
+              <a:rPr b="1" dirty="0"/>
+              <a:t>with other studies related to body ownership illusion present </a:t>
             </a:r>
           </a:p>
         </p:txBody>
@@ -1858,6 +1515,70 @@
           </a:p>
         </p:txBody>
       </p:sp>
+      <p:pic>
+        <p:nvPicPr>
+          <p:cNvPr id="2050" name="Picture 2"/>
+          <p:cNvPicPr>
+            <a:picLocks noChangeAspect="1" noChangeArrowheads="1"/>
+          </p:cNvPicPr>
+          <p:nvPr/>
+        </p:nvPicPr>
+        <p:blipFill>
+          <a:blip r:embed="rId2">
+            <a:extLst>
+              <a:ext uri="{28A0092B-C50C-407E-A947-70E740481C1C}">
+                <a14:useLocalDpi xmlns:a14="http://schemas.microsoft.com/office/drawing/2010/main" val="0"/>
+              </a:ext>
+            </a:extLst>
+          </a:blip>
+          <a:srcRect/>
+          <a:stretch>
+            <a:fillRect/>
+          </a:stretch>
+        </p:blipFill>
+        <p:spPr bwMode="auto">
+          <a:xfrm>
+            <a:off x="627063" y="1506538"/>
+            <a:ext cx="7888287" cy="3846512"/>
+          </a:xfrm>
+          <a:prstGeom prst="rect">
+            <a:avLst/>
+          </a:prstGeom>
+          <a:noFill/>
+          <a:ln>
+            <a:noFill/>
+          </a:ln>
+          <a:effectLst/>
+          <a:extLst>
+            <a:ext uri="{909E8E84-426E-40DD-AFC4-6F175D3DCCD1}">
+              <a14:hiddenFill xmlns:a14="http://schemas.microsoft.com/office/drawing/2010/main">
+                <a:solidFill>
+                  <a:schemeClr val="accent1"/>
+                </a:solidFill>
+              </a14:hiddenFill>
+            </a:ext>
+            <a:ext uri="{91240B29-F687-4F45-9708-019B960494DF}">
+              <a14:hiddenLine xmlns:a14="http://schemas.microsoft.com/office/drawing/2010/main" w="9525">
+                <a:solidFill>
+                  <a:schemeClr val="tx1"/>
+                </a:solidFill>
+                <a:miter lim="800000"/>
+                <a:headEnd/>
+                <a:tailEnd/>
+              </a14:hiddenLine>
+            </a:ext>
+            <a:ext uri="{AF507438-7753-43E0-B8FC-AC1667EBCBE1}">
+              <a14:hiddenEffects xmlns:a14="http://schemas.microsoft.com/office/drawing/2010/main">
+                <a:effectLst>
+                  <a:outerShdw dist="35921" dir="2700000" algn="ctr" rotWithShape="0">
+                    <a:schemeClr val="bg2"/>
+                  </a:outerShdw>
+                </a:effectLst>
+              </a14:hiddenEffects>
+            </a:ext>
+          </a:extLst>
+        </p:spPr>
+      </p:pic>
     </p:spTree>
     <p:extLst>
       <p:ext uri="{BB962C8B-B14F-4D97-AF65-F5344CB8AC3E}">
@@ -1946,7 +1667,7 @@
           </a:ln>
           <a:extLst>
             <a:ext uri="{C572A759-6A51-4108-AA02-DFA0A04FC94B}">
-              <ma14:wrappingTextBoxFlag xmlns="" xmlns:ma14="http://schemas.microsoft.com/office/mac/drawingml/2011/main" val="1"/>
+              <ma14:wrappingTextBoxFlag xmlns:ma14="http://schemas.microsoft.com/office/mac/drawingml/2011/main" xmlns="" val="1"/>
             </a:ext>
           </a:extLst>
         </p:spPr>
@@ -1994,7 +1715,7 @@
           </a:ln>
           <a:extLst>
             <a:ext uri="{C572A759-6A51-4108-AA02-DFA0A04FC94B}">
-              <ma14:wrappingTextBoxFlag xmlns="" xmlns:ma14="http://schemas.microsoft.com/office/mac/drawingml/2011/main" val="1"/>
+              <ma14:wrappingTextBoxFlag xmlns:ma14="http://schemas.microsoft.com/office/mac/drawingml/2011/main" xmlns="" val="1"/>
             </a:ext>
           </a:extLst>
         </p:spPr>
@@ -2076,7 +1797,7 @@
             <a:effectLst/>
             <a:extLst>
               <a:ext uri="{C572A759-6A51-4108-AA02-DFA0A04FC94B}">
-                <ma14:wrappingTextBoxFlag xmlns="" xmlns:ma14="http://schemas.microsoft.com/office/mac/drawingml/2011/main" val="1"/>
+                <ma14:wrappingTextBoxFlag xmlns:ma14="http://schemas.microsoft.com/office/mac/drawingml/2011/main" xmlns="" val="1"/>
               </a:ext>
             </a:extLst>
           </p:spPr>
@@ -2165,7 +1886,7 @@
             <a:effectLst/>
             <a:extLst>
               <a:ext uri="{C572A759-6A51-4108-AA02-DFA0A04FC94B}">
-                <ma14:wrappingTextBoxFlag xmlns="" xmlns:ma14="http://schemas.microsoft.com/office/mac/drawingml/2011/main" val="1"/>
+                <ma14:wrappingTextBoxFlag xmlns:ma14="http://schemas.microsoft.com/office/mac/drawingml/2011/main" xmlns="" val="1"/>
               </a:ext>
             </a:extLst>
           </p:spPr>
@@ -2330,31 +2051,8 @@
                 <a:ea typeface="Tahoma" panose="020B0604030504040204" pitchFamily="34" charset="0"/>
                 <a:cs typeface="Tahoma" panose="020B0604030504040204" pitchFamily="34" charset="0"/>
               </a:rPr>
-              <a:t>COMP-SCI 5542 (SP17) - Big Data Analytics and </a:t>
-            </a:r>
-            <a:r>
-              <a:rPr lang="en-US" sz="1700" b="1" dirty="0" smtClean="0">
-                <a:solidFill>
-                  <a:schemeClr val="accent6">
-                    <a:lumMod val="75000"/>
-                  </a:schemeClr>
-                </a:solidFill>
-                <a:latin typeface="Tahoma" panose="020B0604030504040204" pitchFamily="34" charset="0"/>
-                <a:ea typeface="Tahoma" panose="020B0604030504040204" pitchFamily="34" charset="0"/>
-                <a:cs typeface="Tahoma" panose="020B0604030504040204" pitchFamily="34" charset="0"/>
-              </a:rPr>
-              <a:t>Applications</a:t>
-            </a:r>
-            <a:endParaRPr lang="en-US" sz="1700" b="1" dirty="0" smtClean="0">
-              <a:solidFill>
-                <a:schemeClr val="accent6">
-                  <a:lumMod val="75000"/>
-                </a:schemeClr>
-              </a:solidFill>
-              <a:latin typeface="Tahoma" panose="020B0604030504040204" pitchFamily="34" charset="0"/>
-              <a:ea typeface="Tahoma" panose="020B0604030504040204" pitchFamily="34" charset="0"/>
-              <a:cs typeface="Tahoma" panose="020B0604030504040204" pitchFamily="34" charset="0"/>
-            </a:endParaRPr>
+              <a:t>COMP-SCI 5542 (SP17) - Big Data Analytics and Applications</a:t>
+            </a:r>
           </a:p>
           <a:p>
             <a:pPr algn="ctr"/>
@@ -2459,35 +2157,8 @@
                 <a:ea typeface="Tahoma" panose="020B0604030504040204" pitchFamily="34" charset="0"/>
                 <a:cs typeface="Tahoma" panose="020B0604030504040204" pitchFamily="34" charset="0"/>
               </a:rPr>
-              <a:t>This is the END of the </a:t>
-            </a:r>
-            <a:r>
-              <a:rPr lang="en-US" sz="2800" b="1" u="sng" dirty="0" smtClean="0">
-                <a:effectLst>
-                  <a:outerShdw blurRad="38100" dist="38100" dir="2700000" algn="tl">
-                    <a:srgbClr val="000000">
-                      <a:alpha val="43137"/>
-                    </a:srgbClr>
-                  </a:outerShdw>
-                </a:effectLst>
-                <a:latin typeface="Tahoma" panose="020B0604030504040204" pitchFamily="34" charset="0"/>
-                <a:ea typeface="Tahoma" panose="020B0604030504040204" pitchFamily="34" charset="0"/>
-                <a:cs typeface="Tahoma" panose="020B0604030504040204" pitchFamily="34" charset="0"/>
-              </a:rPr>
-              <a:t>presentation.</a:t>
-            </a:r>
-            <a:endParaRPr lang="en-US" sz="2800" b="1" u="sng" dirty="0" smtClean="0">
-              <a:effectLst>
-                <a:outerShdw blurRad="38100" dist="38100" dir="2700000" algn="tl">
-                  <a:srgbClr val="000000">
-                    <a:alpha val="43137"/>
-                  </a:srgbClr>
-                </a:outerShdw>
-              </a:effectLst>
-              <a:latin typeface="Tahoma" panose="020B0604030504040204" pitchFamily="34" charset="0"/>
-              <a:ea typeface="Tahoma" panose="020B0604030504040204" pitchFamily="34" charset="0"/>
-              <a:cs typeface="Tahoma" panose="020B0604030504040204" pitchFamily="34" charset="0"/>
-            </a:endParaRPr>
+              <a:t>This is the END of the presentation.</a:t>
+            </a:r>
           </a:p>
           <a:p>
             <a:pPr algn="ctr"/>
@@ -4112,25 +3783,7 @@
                 <a:ea typeface="Tahoma" panose="020B0604030504040204" pitchFamily="34" charset="0"/>
                 <a:cs typeface="Tahoma" panose="020B0604030504040204" pitchFamily="34" charset="0"/>
               </a:rPr>
-              <a:t>Experiment </a:t>
-            </a:r>
-            <a:r>
-              <a:rPr lang="en-US" sz="2400" b="1" u="sng" dirty="0" smtClean="0">
-                <a:solidFill>
-                  <a:srgbClr val="7030A0"/>
-                </a:solidFill>
-                <a:effectLst>
-                  <a:outerShdw blurRad="38100" dist="38100" dir="2700000" algn="tl">
-                    <a:srgbClr val="000000">
-                      <a:alpha val="43137"/>
-                    </a:srgbClr>
-                  </a:outerShdw>
-                </a:effectLst>
-                <a:latin typeface="Tahoma" panose="020B0604030504040204" pitchFamily="34" charset="0"/>
-                <a:ea typeface="Tahoma" panose="020B0604030504040204" pitchFamily="34" charset="0"/>
-                <a:cs typeface="Tahoma" panose="020B0604030504040204" pitchFamily="34" charset="0"/>
-              </a:rPr>
-              <a:t>Set-up</a:t>
+              <a:t>Experiment Set-up</a:t>
             </a:r>
             <a:endParaRPr lang="en-US" sz="2400" b="1" u="sng" dirty="0">
               <a:solidFill>
@@ -5282,15 +4935,7 @@
                           <a:ea typeface="Tahoma" panose="020B0604030504040204" pitchFamily="34" charset="0"/>
                           <a:cs typeface="Tahoma" panose="020B0604030504040204" pitchFamily="34" charset="0"/>
                         </a:rPr>
-                        <a:t> </a:t>
-                      </a:r>
-                      <a:r>
-                        <a:rPr lang="en-US" b="1" baseline="0" dirty="0" smtClean="0">
-                          <a:latin typeface="Tahoma" panose="020B0604030504040204" pitchFamily="34" charset="0"/>
-                          <a:ea typeface="Tahoma" panose="020B0604030504040204" pitchFamily="34" charset="0"/>
-                          <a:cs typeface="Tahoma" panose="020B0604030504040204" pitchFamily="34" charset="0"/>
-                        </a:rPr>
-                        <a:t>questionnaire.</a:t>
+                        <a:t> questionnaire.</a:t>
                       </a:r>
                       <a:endParaRPr lang="en-US" b="1" dirty="0">
                         <a:latin typeface="Tahoma" panose="020B0604030504040204" pitchFamily="34" charset="0"/>
@@ -5504,25 +5149,7 @@
                 <a:ea typeface="Tahoma" panose="020B0604030504040204" pitchFamily="34" charset="0"/>
                 <a:cs typeface="Tahoma" panose="020B0604030504040204" pitchFamily="34" charset="0"/>
               </a:rPr>
-              <a:t>Experiment </a:t>
-            </a:r>
-            <a:r>
-              <a:rPr lang="en-US" sz="2400" b="1" u="sng" dirty="0" smtClean="0">
-                <a:solidFill>
-                  <a:srgbClr val="7030A0"/>
-                </a:solidFill>
-                <a:effectLst>
-                  <a:outerShdw blurRad="38100" dist="38100" dir="2700000" algn="tl">
-                    <a:srgbClr val="000000">
-                      <a:alpha val="43137"/>
-                    </a:srgbClr>
-                  </a:outerShdw>
-                </a:effectLst>
-                <a:latin typeface="Tahoma" panose="020B0604030504040204" pitchFamily="34" charset="0"/>
-                <a:ea typeface="Tahoma" panose="020B0604030504040204" pitchFamily="34" charset="0"/>
-                <a:cs typeface="Tahoma" panose="020B0604030504040204" pitchFamily="34" charset="0"/>
-              </a:rPr>
-              <a:t>Procedure - Participants and Illusions</a:t>
+              <a:t>Experiment Procedure - Participants and Illusions</a:t>
             </a:r>
             <a:endParaRPr lang="en-US" sz="2400" b="1" u="sng" dirty="0">
               <a:solidFill>
@@ -5910,7 +5537,7 @@
             <a:graphicData uri="http://schemas.openxmlformats.org/presentationml/2006/ole">
               <mc:AlternateContent xmlns:mc="http://schemas.openxmlformats.org/markup-compatibility/2006">
                 <mc:Choice xmlns:v="urn:schemas-microsoft-com:vml" Requires="v">
-                  <p:oleObj spid="_x0000_s1045" name="Visio" r:id="rId3" imgW="1231200" imgH="303538" progId="Visio.Drawing.15">
+                  <p:oleObj spid="_x0000_s1049" name="Visio" r:id="rId3" imgW="1231200" imgH="303538" progId="Visio.Drawing.15">
                     <p:embed/>
                   </p:oleObj>
                 </mc:Choice>
@@ -6184,7 +5811,7 @@
             <a:graphicData uri="http://schemas.openxmlformats.org/presentationml/2006/ole">
               <mc:AlternateContent xmlns:mc="http://schemas.openxmlformats.org/markup-compatibility/2006">
                 <mc:Choice xmlns:v="urn:schemas-microsoft-com:vml" Requires="v">
-                  <p:oleObj spid="_x0000_s1046" name="Visio" r:id="rId5" imgW="1541700" imgH="298127" progId="Visio.Drawing.15">
+                  <p:oleObj spid="_x0000_s1050" name="Visio" r:id="rId5" imgW="1541700" imgH="298127" progId="Visio.Drawing.15">
                     <p:embed/>
                   </p:oleObj>
                 </mc:Choice>
@@ -7292,61 +6919,7 @@
                 <a:ea typeface="Tahoma" panose="020B0604030504040204" pitchFamily="34" charset="0"/>
                 <a:cs typeface="Tahoma" panose="020B0604030504040204" pitchFamily="34" charset="0"/>
               </a:rPr>
-              <a:t>Experiment </a:t>
-            </a:r>
-            <a:r>
-              <a:rPr lang="en-US" sz="2400" b="1" u="sng" dirty="0" smtClean="0">
-                <a:solidFill>
-                  <a:srgbClr val="7030A0"/>
-                </a:solidFill>
-                <a:effectLst>
-                  <a:outerShdw blurRad="38100" dist="38100" dir="2700000" algn="tl">
-                    <a:srgbClr val="000000">
-                      <a:alpha val="43137"/>
-                    </a:srgbClr>
-                  </a:outerShdw>
-                </a:effectLst>
-                <a:latin typeface="Tahoma" panose="020B0604030504040204" pitchFamily="34" charset="0"/>
-                <a:ea typeface="Tahoma" panose="020B0604030504040204" pitchFamily="34" charset="0"/>
-                <a:cs typeface="Tahoma" panose="020B0604030504040204" pitchFamily="34" charset="0"/>
-              </a:rPr>
-              <a:t>Procedure - </a:t>
-            </a:r>
-            <a:r>
-              <a:rPr lang="en-US" sz="2400" b="1" u="sng" dirty="0" smtClean="0">
-                <a:solidFill>
-                  <a:srgbClr val="7030A0"/>
-                </a:solidFill>
-                <a:effectLst>
-                  <a:outerShdw blurRad="38100" dist="38100" dir="2700000" algn="tl">
-                    <a:srgbClr val="000000">
-                      <a:alpha val="43137"/>
-                    </a:srgbClr>
-                  </a:outerShdw>
-                </a:effectLst>
-                <a:latin typeface="Tahoma" panose="020B0604030504040204" pitchFamily="34" charset="0"/>
-                <a:ea typeface="Tahoma" panose="020B0604030504040204" pitchFamily="34" charset="0"/>
-                <a:cs typeface="Tahoma" panose="020B0604030504040204" pitchFamily="34" charset="0"/>
-              </a:rPr>
-              <a:t>Question are </a:t>
-            </a:r>
-            <a:r>
-              <a:rPr lang="en-US" sz="2400" b="1" u="sng" dirty="0" smtClean="0">
-                <a:solidFill>
-                  <a:srgbClr val="7030A0"/>
-                </a:solidFill>
-                <a:effectLst>
-                  <a:outerShdw blurRad="38100" dist="38100" dir="2700000" algn="tl">
-                    <a:srgbClr val="000000">
-                      <a:alpha val="43137"/>
-                    </a:srgbClr>
-                  </a:outerShdw>
-                </a:effectLst>
-                <a:latin typeface="Tahoma" panose="020B0604030504040204" pitchFamily="34" charset="0"/>
-                <a:ea typeface="Tahoma" panose="020B0604030504040204" pitchFamily="34" charset="0"/>
-                <a:cs typeface="Tahoma" panose="020B0604030504040204" pitchFamily="34" charset="0"/>
-              </a:rPr>
-              <a:t>and Statistics</a:t>
+              <a:t>Experiment Procedure - Question are and Statistics</a:t>
             </a:r>
             <a:endParaRPr lang="en-US" sz="2400" b="1" u="sng" dirty="0">
               <a:solidFill>
@@ -7570,15 +7143,7 @@
                   <a:ea typeface="Tahoma" panose="020B0604030504040204" pitchFamily="34" charset="0"/>
                   <a:cs typeface="Tahoma" panose="020B0604030504040204" pitchFamily="34" charset="0"/>
                 </a:rPr>
-                <a:t>Questionnaire </a:t>
-              </a:r>
-              <a:r>
-                <a:rPr lang="en-US" sz="2000" b="1" dirty="0" smtClean="0">
-                  <a:latin typeface="Tahoma" panose="020B0604030504040204" pitchFamily="34" charset="0"/>
-                  <a:ea typeface="Tahoma" panose="020B0604030504040204" pitchFamily="34" charset="0"/>
-                  <a:cs typeface="Tahoma" panose="020B0604030504040204" pitchFamily="34" charset="0"/>
-                </a:rPr>
-                <a:t>Items</a:t>
+                <a:t>Questionnaire Items</a:t>
               </a:r>
               <a:endParaRPr lang="en-US" sz="2000" b="1" dirty="0">
                 <a:latin typeface="Tahoma" panose="020B0604030504040204" pitchFamily="34" charset="0"/>
@@ -8038,23 +7603,7 @@
                     <a:ea typeface="Tahoma" panose="020B0604030504040204" pitchFamily="34" charset="0"/>
                     <a:cs typeface="Tahoma" panose="020B0604030504040204" pitchFamily="34" charset="0"/>
                   </a:rPr>
-                  <a:t>Repeated </a:t>
-                </a:r>
-                <a:r>
-                  <a:rPr lang="en-US" sz="1600" b="1" dirty="0" smtClean="0">
-                    <a:latin typeface="Tahoma" panose="020B0604030504040204" pitchFamily="34" charset="0"/>
-                    <a:ea typeface="Tahoma" panose="020B0604030504040204" pitchFamily="34" charset="0"/>
-                    <a:cs typeface="Tahoma" panose="020B0604030504040204" pitchFamily="34" charset="0"/>
-                  </a:rPr>
-                  <a:t>measures </a:t>
-                </a:r>
-                <a:r>
-                  <a:rPr lang="en-US" sz="1600" b="1" dirty="0" smtClean="0">
-                    <a:latin typeface="Tahoma" panose="020B0604030504040204" pitchFamily="34" charset="0"/>
-                    <a:ea typeface="Tahoma" panose="020B0604030504040204" pitchFamily="34" charset="0"/>
-                    <a:cs typeface="Tahoma" panose="020B0604030504040204" pitchFamily="34" charset="0"/>
-                  </a:rPr>
-                  <a:t>ANOVA</a:t>
+                  <a:t>Repeated measures ANOVA</a:t>
                 </a:r>
                 <a:endParaRPr lang="en-US" sz="1600" b="1" dirty="0">
                   <a:latin typeface="Tahoma" panose="020B0604030504040204" pitchFamily="34" charset="0"/>
@@ -8248,31 +7797,8 @@
                 <a:ea typeface="Tahoma" panose="020B0604030504040204" pitchFamily="34" charset="0"/>
                 <a:cs typeface="Tahoma" panose="020B0604030504040204" pitchFamily="34" charset="0"/>
               </a:rPr>
-              <a:t>COMP-SCI 5542 (SP17) - Big Data Analytics and </a:t>
-            </a:r>
-            <a:r>
-              <a:rPr lang="en-US" sz="1700" b="1" dirty="0" smtClean="0">
-                <a:solidFill>
-                  <a:schemeClr val="accent6">
-                    <a:lumMod val="75000"/>
-                  </a:schemeClr>
-                </a:solidFill>
-                <a:latin typeface="Tahoma" panose="020B0604030504040204" pitchFamily="34" charset="0"/>
-                <a:ea typeface="Tahoma" panose="020B0604030504040204" pitchFamily="34" charset="0"/>
-                <a:cs typeface="Tahoma" panose="020B0604030504040204" pitchFamily="34" charset="0"/>
-              </a:rPr>
-              <a:t>Applications</a:t>
-            </a:r>
-            <a:endParaRPr lang="en-US" sz="1700" b="1" dirty="0" smtClean="0">
-              <a:solidFill>
-                <a:schemeClr val="accent6">
-                  <a:lumMod val="75000"/>
-                </a:schemeClr>
-              </a:solidFill>
-              <a:latin typeface="Tahoma" panose="020B0604030504040204" pitchFamily="34" charset="0"/>
-              <a:ea typeface="Tahoma" panose="020B0604030504040204" pitchFamily="34" charset="0"/>
-              <a:cs typeface="Tahoma" panose="020B0604030504040204" pitchFamily="34" charset="0"/>
-            </a:endParaRPr>
+              <a:t>COMP-SCI 5542 (SP17) - Big Data Analytics and Applications</a:t>
+            </a:r>
           </a:p>
           <a:p>
             <a:pPr algn="ctr"/>
@@ -8705,14 +8231,14 @@
                 <a:gridCol w="3276600">
                   <a:extLst>
                     <a:ext uri="{9D8B030D-6E8A-4147-A177-3AD203B41FA5}">
-                      <a16:colId xmlns="" xmlns:a16="http://schemas.microsoft.com/office/drawing/2014/main" val="3052766533"/>
+                      <a16:colId xmlns:a16="http://schemas.microsoft.com/office/drawing/2014/main" xmlns="" val="3052766533"/>
                     </a:ext>
                   </a:extLst>
                 </a:gridCol>
                 <a:gridCol w="4724400">
                   <a:extLst>
                     <a:ext uri="{9D8B030D-6E8A-4147-A177-3AD203B41FA5}">
-                      <a16:colId xmlns="" xmlns:a16="http://schemas.microsoft.com/office/drawing/2014/main" val="3560021759"/>
+                      <a16:colId xmlns:a16="http://schemas.microsoft.com/office/drawing/2014/main" xmlns="" val="3560021759"/>
                     </a:ext>
                   </a:extLst>
                 </a:gridCol>
@@ -8746,7 +8272,7 @@
                 </a:tc>
                 <a:extLst>
                   <a:ext uri="{0D108BD9-81ED-4DB2-BD59-A6C34878D82A}">
-                    <a16:rowId xmlns="" xmlns:a16="http://schemas.microsoft.com/office/drawing/2014/main" val="114515421"/>
+                    <a16:rowId xmlns:a16="http://schemas.microsoft.com/office/drawing/2014/main" xmlns="" val="114515421"/>
                   </a:ext>
                 </a:extLst>
               </a:tr>
@@ -8813,7 +8339,7 @@
                 </a:tc>
                 <a:extLst>
                   <a:ext uri="{0D108BD9-81ED-4DB2-BD59-A6C34878D82A}">
-                    <a16:rowId xmlns="" xmlns:a16="http://schemas.microsoft.com/office/drawing/2014/main" val="215559315"/>
+                    <a16:rowId xmlns:a16="http://schemas.microsoft.com/office/drawing/2014/main" xmlns="" val="215559315"/>
                   </a:ext>
                 </a:extLst>
               </a:tr>
@@ -8847,7 +8373,7 @@
                 </a:tc>
                 <a:extLst>
                   <a:ext uri="{0D108BD9-81ED-4DB2-BD59-A6C34878D82A}">
-                    <a16:rowId xmlns="" xmlns:a16="http://schemas.microsoft.com/office/drawing/2014/main" val="259234409"/>
+                    <a16:rowId xmlns:a16="http://schemas.microsoft.com/office/drawing/2014/main" xmlns="" val="259234409"/>
                   </a:ext>
                 </a:extLst>
               </a:tr>
@@ -8899,7 +8425,7 @@
                 </a:tc>
                 <a:extLst>
                   <a:ext uri="{0D108BD9-81ED-4DB2-BD59-A6C34878D82A}">
-                    <a16:rowId xmlns="" xmlns:a16="http://schemas.microsoft.com/office/drawing/2014/main" val="436186924"/>
+                    <a16:rowId xmlns:a16="http://schemas.microsoft.com/office/drawing/2014/main" xmlns="" val="436186924"/>
                   </a:ext>
                 </a:extLst>
               </a:tr>
@@ -8935,14 +8461,14 @@
                 <a:gridCol w="1619250">
                   <a:extLst>
                     <a:ext uri="{9D8B030D-6E8A-4147-A177-3AD203B41FA5}">
-                      <a16:colId xmlns="" xmlns:a16="http://schemas.microsoft.com/office/drawing/2014/main" val="2873523204"/>
+                      <a16:colId xmlns:a16="http://schemas.microsoft.com/office/drawing/2014/main" xmlns="" val="2873523204"/>
                     </a:ext>
                   </a:extLst>
                 </a:gridCol>
                 <a:gridCol w="1619250">
                   <a:extLst>
                     <a:ext uri="{9D8B030D-6E8A-4147-A177-3AD203B41FA5}">
-                      <a16:colId xmlns="" xmlns:a16="http://schemas.microsoft.com/office/drawing/2014/main" val="2464173718"/>
+                      <a16:colId xmlns:a16="http://schemas.microsoft.com/office/drawing/2014/main" xmlns="" val="2464173718"/>
                     </a:ext>
                   </a:extLst>
                 </a:gridCol>
@@ -8976,7 +8502,7 @@
                 </a:tc>
                 <a:extLst>
                   <a:ext uri="{0D108BD9-81ED-4DB2-BD59-A6C34878D82A}">
-                    <a16:rowId xmlns="" xmlns:a16="http://schemas.microsoft.com/office/drawing/2014/main" val="417477286"/>
+                    <a16:rowId xmlns:a16="http://schemas.microsoft.com/office/drawing/2014/main" xmlns="" val="417477286"/>
                   </a:ext>
                 </a:extLst>
               </a:tr>
@@ -9009,7 +8535,7 @@
                 </a:tc>
                 <a:extLst>
                   <a:ext uri="{0D108BD9-81ED-4DB2-BD59-A6C34878D82A}">
-                    <a16:rowId xmlns="" xmlns:a16="http://schemas.microsoft.com/office/drawing/2014/main" val="4208558655"/>
+                    <a16:rowId xmlns:a16="http://schemas.microsoft.com/office/drawing/2014/main" xmlns="" val="4208558655"/>
                   </a:ext>
                 </a:extLst>
               </a:tr>
@@ -9042,7 +8568,7 @@
                 </a:tc>
                 <a:extLst>
                   <a:ext uri="{0D108BD9-81ED-4DB2-BD59-A6C34878D82A}">
-                    <a16:rowId xmlns="" xmlns:a16="http://schemas.microsoft.com/office/drawing/2014/main" val="3202470918"/>
+                    <a16:rowId xmlns:a16="http://schemas.microsoft.com/office/drawing/2014/main" xmlns="" val="3202470918"/>
                   </a:ext>
                 </a:extLst>
               </a:tr>
@@ -9349,14 +8875,14 @@
                 <a:gridCol w="1619250">
                   <a:extLst>
                     <a:ext uri="{9D8B030D-6E8A-4147-A177-3AD203B41FA5}">
-                      <a16:colId xmlns="" xmlns:a16="http://schemas.microsoft.com/office/drawing/2014/main" val="2873523204"/>
+                      <a16:colId xmlns:a16="http://schemas.microsoft.com/office/drawing/2014/main" xmlns="" val="2873523204"/>
                     </a:ext>
                   </a:extLst>
                 </a:gridCol>
                 <a:gridCol w="1619250">
                   <a:extLst>
                     <a:ext uri="{9D8B030D-6E8A-4147-A177-3AD203B41FA5}">
-                      <a16:colId xmlns="" xmlns:a16="http://schemas.microsoft.com/office/drawing/2014/main" val="2464173718"/>
+                      <a16:colId xmlns:a16="http://schemas.microsoft.com/office/drawing/2014/main" xmlns="" val="2464173718"/>
                     </a:ext>
                   </a:extLst>
                 </a:gridCol>
@@ -9390,7 +8916,7 @@
                 </a:tc>
                 <a:extLst>
                   <a:ext uri="{0D108BD9-81ED-4DB2-BD59-A6C34878D82A}">
-                    <a16:rowId xmlns="" xmlns:a16="http://schemas.microsoft.com/office/drawing/2014/main" val="417477286"/>
+                    <a16:rowId xmlns:a16="http://schemas.microsoft.com/office/drawing/2014/main" xmlns="" val="417477286"/>
                   </a:ext>
                 </a:extLst>
               </a:tr>
@@ -9423,7 +8949,7 @@
                 </a:tc>
                 <a:extLst>
                   <a:ext uri="{0D108BD9-81ED-4DB2-BD59-A6C34878D82A}">
-                    <a16:rowId xmlns="" xmlns:a16="http://schemas.microsoft.com/office/drawing/2014/main" val="4208558655"/>
+                    <a16:rowId xmlns:a16="http://schemas.microsoft.com/office/drawing/2014/main" xmlns="" val="4208558655"/>
                   </a:ext>
                 </a:extLst>
               </a:tr>
@@ -9456,7 +8982,7 @@
                 </a:tc>
                 <a:extLst>
                   <a:ext uri="{0D108BD9-81ED-4DB2-BD59-A6C34878D82A}">
-                    <a16:rowId xmlns="" xmlns:a16="http://schemas.microsoft.com/office/drawing/2014/main" val="3202470918"/>
+                    <a16:rowId xmlns:a16="http://schemas.microsoft.com/office/drawing/2014/main" xmlns="" val="3202470918"/>
                   </a:ext>
                 </a:extLst>
               </a:tr>
@@ -9530,7 +9056,7 @@
                 <a:gridCol w="7848600">
                   <a:extLst>
                     <a:ext uri="{9D8B030D-6E8A-4147-A177-3AD203B41FA5}">
-                      <a16:colId xmlns="" xmlns:a16="http://schemas.microsoft.com/office/drawing/2014/main" val="3815015527"/>
+                      <a16:colId xmlns:a16="http://schemas.microsoft.com/office/drawing/2014/main" xmlns="" val="3815015527"/>
                     </a:ext>
                   </a:extLst>
                 </a:gridCol>
@@ -9551,7 +9077,7 @@
                 </a:tc>
                 <a:extLst>
                   <a:ext uri="{0D108BD9-81ED-4DB2-BD59-A6C34878D82A}">
-                    <a16:rowId xmlns="" xmlns:a16="http://schemas.microsoft.com/office/drawing/2014/main" val="530076699"/>
+                    <a16:rowId xmlns:a16="http://schemas.microsoft.com/office/drawing/2014/main" xmlns="" val="530076699"/>
                   </a:ext>
                 </a:extLst>
               </a:tr>
@@ -9579,7 +9105,7 @@
                 </a:tc>
                 <a:extLst>
                   <a:ext uri="{0D108BD9-81ED-4DB2-BD59-A6C34878D82A}">
-                    <a16:rowId xmlns="" xmlns:a16="http://schemas.microsoft.com/office/drawing/2014/main" val="2903200580"/>
+                    <a16:rowId xmlns:a16="http://schemas.microsoft.com/office/drawing/2014/main" xmlns="" val="2903200580"/>
                   </a:ext>
                 </a:extLst>
               </a:tr>
@@ -9607,7 +9133,7 @@
                 </a:tc>
                 <a:extLst>
                   <a:ext uri="{0D108BD9-81ED-4DB2-BD59-A6C34878D82A}">
-                    <a16:rowId xmlns="" xmlns:a16="http://schemas.microsoft.com/office/drawing/2014/main" val="2336658263"/>
+                    <a16:rowId xmlns:a16="http://schemas.microsoft.com/office/drawing/2014/main" xmlns="" val="2336658263"/>
                   </a:ext>
                 </a:extLst>
               </a:tr>
@@ -9635,7 +9161,7 @@
                 </a:tc>
                 <a:extLst>
                   <a:ext uri="{0D108BD9-81ED-4DB2-BD59-A6C34878D82A}">
-                    <a16:rowId xmlns="" xmlns:a16="http://schemas.microsoft.com/office/drawing/2014/main" val="964974653"/>
+                    <a16:rowId xmlns:a16="http://schemas.microsoft.com/office/drawing/2014/main" xmlns="" val="964974653"/>
                   </a:ext>
                 </a:extLst>
               </a:tr>
@@ -10101,7 +9627,7 @@
                 <a14:useLocalDpi xmlns:a14="http://schemas.microsoft.com/office/drawing/2010/main" val="0"/>
               </a:ext>
               <a:ext uri="{96DAC541-7B7A-43D3-8B79-37D633B846F1}">
-                <asvg:svgBlip xmlns="" xmlns:asvg="http://schemas.microsoft.com/office/drawing/2016/SVG/main" r:embed="rId3"/>
+                <asvg:svgBlip xmlns:asvg="http://schemas.microsoft.com/office/drawing/2016/SVG/main" xmlns="" r:embed="rId3"/>
               </a:ext>
             </a:extLst>
           </a:blip>
@@ -10134,7 +9660,7 @@
                 <a14:useLocalDpi xmlns:a14="http://schemas.microsoft.com/office/drawing/2010/main" val="0"/>
               </a:ext>
               <a:ext uri="{96DAC541-7B7A-43D3-8B79-37D633B846F1}">
-                <asvg:svgBlip xmlns="" xmlns:asvg="http://schemas.microsoft.com/office/drawing/2016/SVG/main" r:embed="rId5"/>
+                <asvg:svgBlip xmlns:asvg="http://schemas.microsoft.com/office/drawing/2016/SVG/main" xmlns="" r:embed="rId5"/>
               </a:ext>
             </a:extLst>
           </a:blip>
@@ -10187,11 +9713,19 @@
           <a:p>
             <a:r>
               <a:rPr lang="en-US" b="1" dirty="0"/>
-              <a:t>There is no conceptual difference if a virtual body was replaced by a real-person’s body except for emotional and affective aspects</a:t>
-            </a:r>
-            <a:r>
-              <a:rPr lang="zh-CN" altLang="en-US" b="1" dirty="0"/>
-              <a:t>。</a:t>
+              <a:t>There is no conceptual difference if a virtual body was replaced by a real-person’s body except for emotional and </a:t>
+            </a:r>
+            <a:r>
+              <a:rPr lang="en-US" b="1"/>
+              <a:t>affective </a:t>
+            </a:r>
+            <a:r>
+              <a:rPr lang="en-US" b="1" smtClean="0"/>
+              <a:t>aspects</a:t>
+            </a:r>
+            <a:r>
+              <a:rPr lang="en-US" altLang="zh-CN" b="1" smtClean="0"/>
+              <a:t>.</a:t>
             </a:r>
             <a:endParaRPr lang="en-US" b="1" dirty="0"/>
           </a:p>

</xml_diff>